<commit_message>
Simplified points on NEURON plans page; added ModelDB as a NEURON resource
(Really, ModelDB is a resource for all simulators, but over 575 NEURON models on ModelDB.)
</commit_message>
<xml_diff>
--- a/Part_1_Resources_for_computational_modellers/4_Simulation_environments/neuron.pptx
+++ b/Part_1_Resources_for_computational_modellers/4_Simulation_environments/neuron.pptx
@@ -289,7 +289,7 @@
             <a:fld id="{BA62819A-11C7-D64A-8DB7-46D5D97A0A81}" type="datetimeFigureOut">
               <a:rPr lang="en-US" altLang="x-none"/>
               <a:pPr/>
-              <a:t>6/26/2017</a:t>
+              <a:t>6/28/2017</a:t>
             </a:fld>
             <a:endParaRPr lang="en-US" altLang="x-none"/>
           </a:p>
@@ -449,17 +449,17 @@
           <a:effectLst/>
           <a:extLst>
             <a:ext uri="{FAA26D3D-D897-4be2-8F04-BA451C77F1D7}">
-              <ma14:placeholderFlag xmlns:ma14="http://schemas.microsoft.com/office/mac/drawingml/2011/main" xmlns="" val="1"/>
+              <ma14:placeholderFlag xmlns="" xmlns:ma14="http://schemas.microsoft.com/office/mac/drawingml/2011/main" val="1"/>
             </a:ext>
             <a:ext uri="{909E8E84-426E-40dd-AFC4-6F175D3DCCD1}">
-              <a14:hiddenFill xmlns="" xmlns:a14="http://schemas.microsoft.com/office/drawing/2010/main">
+              <a14:hiddenFill xmlns:a14="http://schemas.microsoft.com/office/drawing/2010/main" xmlns="">
                 <a:solidFill>
                   <a:srgbClr val="FFFFFF"/>
                 </a:solidFill>
               </a14:hiddenFill>
             </a:ext>
             <a:ext uri="{91240B29-F687-4f45-9708-019B960494DF}">
-              <a14:hiddenLine xmlns="" xmlns:a14="http://schemas.microsoft.com/office/drawing/2010/main" w="9525" cap="flat">
+              <a14:hiddenLine xmlns:a14="http://schemas.microsoft.com/office/drawing/2010/main" xmlns="" w="9525" cap="flat">
                 <a:solidFill>
                   <a:srgbClr val="3465A4"/>
                 </a:solidFill>
@@ -469,7 +469,7 @@
               </a14:hiddenLine>
             </a:ext>
             <a:ext uri="{AF507438-7753-43e0-B8FC-AC1667EBCBE1}">
-              <a14:hiddenEffects xmlns="" xmlns:a14="http://schemas.microsoft.com/office/drawing/2010/main">
+              <a14:hiddenEffects xmlns:a14="http://schemas.microsoft.com/office/drawing/2010/main" xmlns="">
                 <a:effectLst>
                   <a:outerShdw blurRad="63500" dist="38099" dir="2700000" algn="ctr" rotWithShape="0">
                     <a:schemeClr val="bg2">
@@ -507,17 +507,17 @@
           <a:effectLst/>
           <a:extLst>
             <a:ext uri="{FAA26D3D-D897-4be2-8F04-BA451C77F1D7}">
-              <ma14:placeholderFlag xmlns:ma14="http://schemas.microsoft.com/office/mac/drawingml/2011/main" xmlns="" val="1"/>
+              <ma14:placeholderFlag xmlns="" xmlns:ma14="http://schemas.microsoft.com/office/mac/drawingml/2011/main" val="1"/>
             </a:ext>
             <a:ext uri="{909E8E84-426E-40dd-AFC4-6F175D3DCCD1}">
-              <a14:hiddenFill xmlns="" xmlns:a14="http://schemas.microsoft.com/office/drawing/2010/main">
+              <a14:hiddenFill xmlns:a14="http://schemas.microsoft.com/office/drawing/2010/main" xmlns="">
                 <a:solidFill>
                   <a:srgbClr val="FFFFFF"/>
                 </a:solidFill>
               </a14:hiddenFill>
             </a:ext>
             <a:ext uri="{91240B29-F687-4f45-9708-019B960494DF}">
-              <a14:hiddenLine xmlns="" xmlns:a14="http://schemas.microsoft.com/office/drawing/2010/main" w="9525" cap="flat">
+              <a14:hiddenLine xmlns:a14="http://schemas.microsoft.com/office/drawing/2010/main" xmlns="" w="9525" cap="flat">
                 <a:solidFill>
                   <a:srgbClr val="3465A4"/>
                 </a:solidFill>
@@ -527,7 +527,7 @@
               </a14:hiddenLine>
             </a:ext>
             <a:ext uri="{AF507438-7753-43e0-B8FC-AC1667EBCBE1}">
-              <a14:hiddenEffects xmlns="" xmlns:a14="http://schemas.microsoft.com/office/drawing/2010/main">
+              <a14:hiddenEffects xmlns:a14="http://schemas.microsoft.com/office/drawing/2010/main" xmlns="">
                 <a:effectLst>
                   <a:outerShdw blurRad="63500" dist="38099" dir="2700000" algn="ctr" rotWithShape="0">
                     <a:schemeClr val="bg2">
@@ -577,17 +577,17 @@
           <a:effectLst/>
           <a:extLst>
             <a:ext uri="{FAA26D3D-D897-4be2-8F04-BA451C77F1D7}">
-              <ma14:placeholderFlag xmlns:ma14="http://schemas.microsoft.com/office/mac/drawingml/2011/main" xmlns="" val="1"/>
+              <ma14:placeholderFlag xmlns="" xmlns:ma14="http://schemas.microsoft.com/office/mac/drawingml/2011/main" val="1"/>
             </a:ext>
             <a:ext uri="{909E8E84-426E-40dd-AFC4-6F175D3DCCD1}">
-              <a14:hiddenFill xmlns="" xmlns:a14="http://schemas.microsoft.com/office/drawing/2010/main">
+              <a14:hiddenFill xmlns:a14="http://schemas.microsoft.com/office/drawing/2010/main" xmlns="">
                 <a:solidFill>
                   <a:srgbClr val="FFFFFF"/>
                 </a:solidFill>
               </a14:hiddenFill>
             </a:ext>
             <a:ext uri="{91240B29-F687-4f45-9708-019B960494DF}">
-              <a14:hiddenLine xmlns="" xmlns:a14="http://schemas.microsoft.com/office/drawing/2010/main" w="9525" cap="flat">
+              <a14:hiddenLine xmlns:a14="http://schemas.microsoft.com/office/drawing/2010/main" xmlns="" w="9525" cap="flat">
                 <a:solidFill>
                   <a:srgbClr val="3465A4"/>
                 </a:solidFill>
@@ -597,7 +597,7 @@
               </a14:hiddenLine>
             </a:ext>
             <a:ext uri="{AF507438-7753-43e0-B8FC-AC1667EBCBE1}">
-              <a14:hiddenEffects xmlns="" xmlns:a14="http://schemas.microsoft.com/office/drawing/2010/main">
+              <a14:hiddenEffects xmlns:a14="http://schemas.microsoft.com/office/drawing/2010/main" xmlns="">
                 <a:effectLst>
                   <a:outerShdw blurRad="63500" dist="38099" dir="2700000" algn="ctr" rotWithShape="0">
                     <a:schemeClr val="bg2">
@@ -675,17 +675,17 @@
           <a:effectLst/>
           <a:extLst>
             <a:ext uri="{FAA26D3D-D897-4be2-8F04-BA451C77F1D7}">
-              <ma14:placeholderFlag xmlns:ma14="http://schemas.microsoft.com/office/mac/drawingml/2011/main" xmlns="" val="1"/>
+              <ma14:placeholderFlag xmlns="" xmlns:ma14="http://schemas.microsoft.com/office/mac/drawingml/2011/main" val="1"/>
             </a:ext>
             <a:ext uri="{909E8E84-426E-40dd-AFC4-6F175D3DCCD1}">
-              <a14:hiddenFill xmlns="" xmlns:a14="http://schemas.microsoft.com/office/drawing/2010/main">
+              <a14:hiddenFill xmlns:a14="http://schemas.microsoft.com/office/drawing/2010/main" xmlns="">
                 <a:solidFill>
                   <a:srgbClr val="FFFFFF"/>
                 </a:solidFill>
               </a14:hiddenFill>
             </a:ext>
             <a:ext uri="{91240B29-F687-4f45-9708-019B960494DF}">
-              <a14:hiddenLine xmlns="" xmlns:a14="http://schemas.microsoft.com/office/drawing/2010/main" w="9525" cap="flat">
+              <a14:hiddenLine xmlns:a14="http://schemas.microsoft.com/office/drawing/2010/main" xmlns="" w="9525" cap="flat">
                 <a:solidFill>
                   <a:srgbClr val="3465A4"/>
                 </a:solidFill>
@@ -695,7 +695,7 @@
               </a14:hiddenLine>
             </a:ext>
             <a:ext uri="{AF507438-7753-43e0-B8FC-AC1667EBCBE1}">
-              <a14:hiddenEffects xmlns="" xmlns:a14="http://schemas.microsoft.com/office/drawing/2010/main">
+              <a14:hiddenEffects xmlns:a14="http://schemas.microsoft.com/office/drawing/2010/main" xmlns="">
                 <a:effectLst>
                   <a:outerShdw blurRad="63500" dist="38099" dir="2700000" algn="ctr" rotWithShape="0">
                     <a:schemeClr val="bg2">
@@ -773,17 +773,17 @@
           <a:effectLst/>
           <a:extLst>
             <a:ext uri="{FAA26D3D-D897-4be2-8F04-BA451C77F1D7}">
-              <ma14:placeholderFlag xmlns:ma14="http://schemas.microsoft.com/office/mac/drawingml/2011/main" xmlns="" val="1"/>
+              <ma14:placeholderFlag xmlns="" xmlns:ma14="http://schemas.microsoft.com/office/mac/drawingml/2011/main" val="1"/>
             </a:ext>
             <a:ext uri="{909E8E84-426E-40dd-AFC4-6F175D3DCCD1}">
-              <a14:hiddenFill xmlns="" xmlns:a14="http://schemas.microsoft.com/office/drawing/2010/main">
+              <a14:hiddenFill xmlns:a14="http://schemas.microsoft.com/office/drawing/2010/main" xmlns="">
                 <a:solidFill>
                   <a:srgbClr val="FFFFFF"/>
                 </a:solidFill>
               </a14:hiddenFill>
             </a:ext>
             <a:ext uri="{91240B29-F687-4f45-9708-019B960494DF}">
-              <a14:hiddenLine xmlns="" xmlns:a14="http://schemas.microsoft.com/office/drawing/2010/main" w="9525" cap="flat">
+              <a14:hiddenLine xmlns:a14="http://schemas.microsoft.com/office/drawing/2010/main" xmlns="" w="9525" cap="flat">
                 <a:solidFill>
                   <a:srgbClr val="3465A4"/>
                 </a:solidFill>
@@ -793,7 +793,7 @@
               </a14:hiddenLine>
             </a:ext>
             <a:ext uri="{AF507438-7753-43e0-B8FC-AC1667EBCBE1}">
-              <a14:hiddenEffects xmlns="" xmlns:a14="http://schemas.microsoft.com/office/drawing/2010/main">
+              <a14:hiddenEffects xmlns:a14="http://schemas.microsoft.com/office/drawing/2010/main" xmlns="">
                 <a:effectLst>
                   <a:outerShdw blurRad="63500" dist="38099" dir="2700000" algn="ctr" rotWithShape="0">
                     <a:schemeClr val="bg2">
@@ -871,17 +871,17 @@
           <a:effectLst/>
           <a:extLst>
             <a:ext uri="{FAA26D3D-D897-4be2-8F04-BA451C77F1D7}">
-              <ma14:placeholderFlag xmlns:ma14="http://schemas.microsoft.com/office/mac/drawingml/2011/main" xmlns="" val="1"/>
+              <ma14:placeholderFlag xmlns="" xmlns:ma14="http://schemas.microsoft.com/office/mac/drawingml/2011/main" val="1"/>
             </a:ext>
             <a:ext uri="{909E8E84-426E-40dd-AFC4-6F175D3DCCD1}">
-              <a14:hiddenFill xmlns="" xmlns:a14="http://schemas.microsoft.com/office/drawing/2010/main">
+              <a14:hiddenFill xmlns:a14="http://schemas.microsoft.com/office/drawing/2010/main" xmlns="">
                 <a:solidFill>
                   <a:srgbClr val="FFFFFF"/>
                 </a:solidFill>
               </a14:hiddenFill>
             </a:ext>
             <a:ext uri="{91240B29-F687-4f45-9708-019B960494DF}">
-              <a14:hiddenLine xmlns="" xmlns:a14="http://schemas.microsoft.com/office/drawing/2010/main" w="9525" cap="flat">
+              <a14:hiddenLine xmlns:a14="http://schemas.microsoft.com/office/drawing/2010/main" xmlns="" w="9525" cap="flat">
                 <a:solidFill>
                   <a:srgbClr val="3465A4"/>
                 </a:solidFill>
@@ -891,7 +891,7 @@
               </a14:hiddenLine>
             </a:ext>
             <a:ext uri="{AF507438-7753-43e0-B8FC-AC1667EBCBE1}">
-              <a14:hiddenEffects xmlns="" xmlns:a14="http://schemas.microsoft.com/office/drawing/2010/main">
+              <a14:hiddenEffects xmlns:a14="http://schemas.microsoft.com/office/drawing/2010/main" xmlns="">
                 <a:effectLst>
                   <a:outerShdw blurRad="63500" dist="38099" dir="2700000" algn="ctr" rotWithShape="0">
                     <a:schemeClr val="bg2">
@@ -1431,7 +1431,7 @@
           </a:ln>
           <a:extLst>
             <a:ext uri="{AF507438-7753-43e0-B8FC-AC1667EBCBE1}">
-              <a14:hiddenEffects xmlns="" xmlns:a14="http://schemas.microsoft.com/office/drawing/2010/main">
+              <a14:hiddenEffects xmlns:a14="http://schemas.microsoft.com/office/drawing/2010/main" xmlns="">
                 <a:effectLst>
                   <a:outerShdw blurRad="63500" dist="38099" dir="2700000" algn="ctr" rotWithShape="0">
                     <a:srgbClr val="000000">
@@ -1462,7 +1462,7 @@
           <a:ln/>
           <a:extLst>
             <a:ext uri="{AF507438-7753-43e0-B8FC-AC1667EBCBE1}">
-              <a14:hiddenEffects xmlns="" xmlns:a14="http://schemas.microsoft.com/office/drawing/2010/main">
+              <a14:hiddenEffects xmlns:a14="http://schemas.microsoft.com/office/drawing/2010/main" xmlns="">
                 <a:effectLst>
                   <a:outerShdw blurRad="63500" dist="38099" dir="2700000" algn="ctr" rotWithShape="0">
                     <a:srgbClr val="000000">
@@ -1822,7 +1822,7 @@
           </a:ln>
           <a:extLst>
             <a:ext uri="{AF507438-7753-43e0-B8FC-AC1667EBCBE1}">
-              <a14:hiddenEffects xmlns="" xmlns:a14="http://schemas.microsoft.com/office/drawing/2010/main">
+              <a14:hiddenEffects xmlns:a14="http://schemas.microsoft.com/office/drawing/2010/main" xmlns="">
                 <a:effectLst>
                   <a:outerShdw blurRad="63500" dist="38099" dir="2700000" algn="ctr" rotWithShape="0">
                     <a:srgbClr val="000000">
@@ -1853,7 +1853,7 @@
           <a:ln/>
           <a:extLst>
             <a:ext uri="{AF507438-7753-43e0-B8FC-AC1667EBCBE1}">
-              <a14:hiddenEffects xmlns="" xmlns:a14="http://schemas.microsoft.com/office/drawing/2010/main">
+              <a14:hiddenEffects xmlns:a14="http://schemas.microsoft.com/office/drawing/2010/main" xmlns="">
                 <a:effectLst>
                   <a:outerShdw blurRad="63500" dist="38099" dir="2700000" algn="ctr" rotWithShape="0">
                     <a:srgbClr val="000000">
@@ -2213,7 +2213,7 @@
           </a:ln>
           <a:extLst>
             <a:ext uri="{AF507438-7753-43e0-B8FC-AC1667EBCBE1}">
-              <a14:hiddenEffects xmlns="" xmlns:a14="http://schemas.microsoft.com/office/drawing/2010/main">
+              <a14:hiddenEffects xmlns:a14="http://schemas.microsoft.com/office/drawing/2010/main" xmlns="">
                 <a:effectLst>
                   <a:outerShdw blurRad="63500" dist="38099" dir="2700000" algn="ctr" rotWithShape="0">
                     <a:srgbClr val="000000">
@@ -2244,7 +2244,7 @@
           <a:ln/>
           <a:extLst>
             <a:ext uri="{AF507438-7753-43e0-B8FC-AC1667EBCBE1}">
-              <a14:hiddenEffects xmlns="" xmlns:a14="http://schemas.microsoft.com/office/drawing/2010/main">
+              <a14:hiddenEffects xmlns:a14="http://schemas.microsoft.com/office/drawing/2010/main" xmlns="">
                 <a:effectLst>
                   <a:outerShdw blurRad="63500" dist="38099" dir="2700000" algn="ctr" rotWithShape="0">
                     <a:srgbClr val="000000">
@@ -2604,7 +2604,7 @@
           </a:ln>
           <a:extLst>
             <a:ext uri="{AF507438-7753-43e0-B8FC-AC1667EBCBE1}">
-              <a14:hiddenEffects xmlns="" xmlns:a14="http://schemas.microsoft.com/office/drawing/2010/main">
+              <a14:hiddenEffects xmlns:a14="http://schemas.microsoft.com/office/drawing/2010/main" xmlns="">
                 <a:effectLst>
                   <a:outerShdw blurRad="63500" dist="38099" dir="2700000" algn="ctr" rotWithShape="0">
                     <a:srgbClr val="000000">
@@ -2635,7 +2635,7 @@
           <a:ln/>
           <a:extLst>
             <a:ext uri="{AF507438-7753-43e0-B8FC-AC1667EBCBE1}">
-              <a14:hiddenEffects xmlns="" xmlns:a14="http://schemas.microsoft.com/office/drawing/2010/main">
+              <a14:hiddenEffects xmlns:a14="http://schemas.microsoft.com/office/drawing/2010/main" xmlns="">
                 <a:effectLst>
                   <a:outerShdw blurRad="63500" dist="38099" dir="2700000" algn="ctr" rotWithShape="0">
                     <a:srgbClr val="000000">
@@ -5251,17 +5251,17 @@
           <a:effectLst/>
           <a:extLst>
             <a:ext uri="{FAA26D3D-D897-4be2-8F04-BA451C77F1D7}">
-              <ma14:placeholderFlag xmlns:ma14="http://schemas.microsoft.com/office/mac/drawingml/2011/main" xmlns="" val="1"/>
+              <ma14:placeholderFlag xmlns="" xmlns:ma14="http://schemas.microsoft.com/office/mac/drawingml/2011/main" val="1"/>
             </a:ext>
             <a:ext uri="{909E8E84-426E-40dd-AFC4-6F175D3DCCD1}">
-              <a14:hiddenFill xmlns="" xmlns:a14="http://schemas.microsoft.com/office/drawing/2010/main">
+              <a14:hiddenFill xmlns:a14="http://schemas.microsoft.com/office/drawing/2010/main" xmlns="">
                 <a:solidFill>
                   <a:srgbClr val="FFFFFF"/>
                 </a:solidFill>
               </a14:hiddenFill>
             </a:ext>
             <a:ext uri="{91240B29-F687-4f45-9708-019B960494DF}">
-              <a14:hiddenLine xmlns="" xmlns:a14="http://schemas.microsoft.com/office/drawing/2010/main" w="9525" cap="flat">
+              <a14:hiddenLine xmlns:a14="http://schemas.microsoft.com/office/drawing/2010/main" xmlns="" w="9525" cap="flat">
                 <a:solidFill>
                   <a:srgbClr val="3465A4"/>
                 </a:solidFill>
@@ -5271,7 +5271,7 @@
               </a14:hiddenLine>
             </a:ext>
             <a:ext uri="{AF507438-7753-43e0-B8FC-AC1667EBCBE1}">
-              <a14:hiddenEffects xmlns="" xmlns:a14="http://schemas.microsoft.com/office/drawing/2010/main">
+              <a14:hiddenEffects xmlns:a14="http://schemas.microsoft.com/office/drawing/2010/main" xmlns="">
                 <a:effectLst>
                   <a:outerShdw blurRad="63500" dist="38099" dir="2700000" algn="ctr" rotWithShape="0">
                     <a:schemeClr val="bg2">
@@ -5324,17 +5324,17 @@
           <a:effectLst/>
           <a:extLst>
             <a:ext uri="{FAA26D3D-D897-4be2-8F04-BA451C77F1D7}">
-              <ma14:placeholderFlag xmlns:ma14="http://schemas.microsoft.com/office/mac/drawingml/2011/main" xmlns="" val="1"/>
+              <ma14:placeholderFlag xmlns="" xmlns:ma14="http://schemas.microsoft.com/office/mac/drawingml/2011/main" val="1"/>
             </a:ext>
             <a:ext uri="{909E8E84-426E-40dd-AFC4-6F175D3DCCD1}">
-              <a14:hiddenFill xmlns="" xmlns:a14="http://schemas.microsoft.com/office/drawing/2010/main">
+              <a14:hiddenFill xmlns:a14="http://schemas.microsoft.com/office/drawing/2010/main" xmlns="">
                 <a:solidFill>
                   <a:srgbClr val="FFFFFF"/>
                 </a:solidFill>
               </a14:hiddenFill>
             </a:ext>
             <a:ext uri="{91240B29-F687-4f45-9708-019B960494DF}">
-              <a14:hiddenLine xmlns="" xmlns:a14="http://schemas.microsoft.com/office/drawing/2010/main" w="9525" cap="flat">
+              <a14:hiddenLine xmlns:a14="http://schemas.microsoft.com/office/drawing/2010/main" xmlns="" w="9525" cap="flat">
                 <a:solidFill>
                   <a:srgbClr val="3465A4"/>
                 </a:solidFill>
@@ -5344,7 +5344,7 @@
               </a14:hiddenLine>
             </a:ext>
             <a:ext uri="{AF507438-7753-43e0-B8FC-AC1667EBCBE1}">
-              <a14:hiddenEffects xmlns="" xmlns:a14="http://schemas.microsoft.com/office/drawing/2010/main">
+              <a14:hiddenEffects xmlns:a14="http://schemas.microsoft.com/office/drawing/2010/main" xmlns="">
                 <a:effectLst>
                   <a:outerShdw blurRad="63500" dist="38099" dir="2700000" algn="ctr" rotWithShape="0">
                     <a:schemeClr val="bg2">
@@ -5439,17 +5439,17 @@
           <a:effectLst/>
           <a:extLst>
             <a:ext uri="{FAA26D3D-D897-4be2-8F04-BA451C77F1D7}">
-              <ma14:placeholderFlag xmlns:ma14="http://schemas.microsoft.com/office/mac/drawingml/2011/main" xmlns="" val="1"/>
+              <ma14:placeholderFlag xmlns="" xmlns:ma14="http://schemas.microsoft.com/office/mac/drawingml/2011/main" val="1"/>
             </a:ext>
             <a:ext uri="{909E8E84-426E-40dd-AFC4-6F175D3DCCD1}">
-              <a14:hiddenFill xmlns="" xmlns:a14="http://schemas.microsoft.com/office/drawing/2010/main">
+              <a14:hiddenFill xmlns:a14="http://schemas.microsoft.com/office/drawing/2010/main" xmlns="">
                 <a:solidFill>
                   <a:srgbClr val="FFFFFF"/>
                 </a:solidFill>
               </a14:hiddenFill>
             </a:ext>
             <a:ext uri="{91240B29-F687-4f45-9708-019B960494DF}">
-              <a14:hiddenLine xmlns="" xmlns:a14="http://schemas.microsoft.com/office/drawing/2010/main" w="9525" cap="flat">
+              <a14:hiddenLine xmlns:a14="http://schemas.microsoft.com/office/drawing/2010/main" xmlns="" w="9525" cap="flat">
                 <a:solidFill>
                   <a:srgbClr val="3465A4"/>
                 </a:solidFill>
@@ -5459,7 +5459,7 @@
               </a14:hiddenLine>
             </a:ext>
             <a:ext uri="{AF507438-7753-43e0-B8FC-AC1667EBCBE1}">
-              <a14:hiddenEffects xmlns="" xmlns:a14="http://schemas.microsoft.com/office/drawing/2010/main">
+              <a14:hiddenEffects xmlns:a14="http://schemas.microsoft.com/office/drawing/2010/main" xmlns="">
                 <a:effectLst>
                   <a:outerShdw blurRad="63500" dist="38099" dir="2700000" algn="ctr" rotWithShape="0">
                     <a:schemeClr val="bg2">
@@ -5535,17 +5535,17 @@
           <a:effectLst/>
           <a:extLst>
             <a:ext uri="{FAA26D3D-D897-4be2-8F04-BA451C77F1D7}">
-              <ma14:placeholderFlag xmlns:ma14="http://schemas.microsoft.com/office/mac/drawingml/2011/main" xmlns="" val="1"/>
+              <ma14:placeholderFlag xmlns="" xmlns:ma14="http://schemas.microsoft.com/office/mac/drawingml/2011/main" val="1"/>
             </a:ext>
             <a:ext uri="{909E8E84-426E-40dd-AFC4-6F175D3DCCD1}">
-              <a14:hiddenFill xmlns="" xmlns:a14="http://schemas.microsoft.com/office/drawing/2010/main">
+              <a14:hiddenFill xmlns:a14="http://schemas.microsoft.com/office/drawing/2010/main" xmlns="">
                 <a:solidFill>
                   <a:srgbClr val="FFFFFF"/>
                 </a:solidFill>
               </a14:hiddenFill>
             </a:ext>
             <a:ext uri="{91240B29-F687-4f45-9708-019B960494DF}">
-              <a14:hiddenLine xmlns="" xmlns:a14="http://schemas.microsoft.com/office/drawing/2010/main" w="9525" cap="flat">
+              <a14:hiddenLine xmlns:a14="http://schemas.microsoft.com/office/drawing/2010/main" xmlns="" w="9525" cap="flat">
                 <a:solidFill>
                   <a:srgbClr val="3465A4"/>
                 </a:solidFill>
@@ -5555,7 +5555,7 @@
               </a14:hiddenLine>
             </a:ext>
             <a:ext uri="{AF507438-7753-43e0-B8FC-AC1667EBCBE1}">
-              <a14:hiddenEffects xmlns="" xmlns:a14="http://schemas.microsoft.com/office/drawing/2010/main">
+              <a14:hiddenEffects xmlns:a14="http://schemas.microsoft.com/office/drawing/2010/main" xmlns="">
                 <a:effectLst>
                   <a:outerShdw blurRad="63500" dist="38099" dir="2700000" algn="ctr" rotWithShape="0">
                     <a:schemeClr val="bg2">
@@ -5633,17 +5633,17 @@
           <a:effectLst/>
           <a:extLst>
             <a:ext uri="{FAA26D3D-D897-4be2-8F04-BA451C77F1D7}">
-              <ma14:placeholderFlag xmlns:ma14="http://schemas.microsoft.com/office/mac/drawingml/2011/main" xmlns="" val="1"/>
+              <ma14:placeholderFlag xmlns="" xmlns:ma14="http://schemas.microsoft.com/office/mac/drawingml/2011/main" val="1"/>
             </a:ext>
             <a:ext uri="{909E8E84-426E-40dd-AFC4-6F175D3DCCD1}">
-              <a14:hiddenFill xmlns="" xmlns:a14="http://schemas.microsoft.com/office/drawing/2010/main">
+              <a14:hiddenFill xmlns:a14="http://schemas.microsoft.com/office/drawing/2010/main" xmlns="">
                 <a:solidFill>
                   <a:srgbClr val="FFFFFF"/>
                 </a:solidFill>
               </a14:hiddenFill>
             </a:ext>
             <a:ext uri="{91240B29-F687-4f45-9708-019B960494DF}">
-              <a14:hiddenLine xmlns="" xmlns:a14="http://schemas.microsoft.com/office/drawing/2010/main" w="9525" cap="flat">
+              <a14:hiddenLine xmlns:a14="http://schemas.microsoft.com/office/drawing/2010/main" xmlns="" w="9525" cap="flat">
                 <a:solidFill>
                   <a:srgbClr val="3465A4"/>
                 </a:solidFill>
@@ -5653,7 +5653,7 @@
               </a14:hiddenLine>
             </a:ext>
             <a:ext uri="{AF507438-7753-43e0-B8FC-AC1667EBCBE1}">
-              <a14:hiddenEffects xmlns="" xmlns:a14="http://schemas.microsoft.com/office/drawing/2010/main">
+              <a14:hiddenEffects xmlns:a14="http://schemas.microsoft.com/office/drawing/2010/main" xmlns="">
                 <a:effectLst>
                   <a:outerShdw blurRad="63500" dist="38099" dir="2700000" algn="ctr" rotWithShape="0">
                     <a:schemeClr val="bg2">
@@ -6394,14 +6394,14 @@
           <a:effectLst/>
           <a:extLst>
             <a:ext uri="{909E8E84-426E-40dd-AFC4-6F175D3DCCD1}">
-              <a14:hiddenFill xmlns="" xmlns:a14="http://schemas.microsoft.com/office/drawing/2010/main">
+              <a14:hiddenFill xmlns:a14="http://schemas.microsoft.com/office/drawing/2010/main" xmlns="">
                 <a:solidFill>
                   <a:srgbClr val="FFFFFF"/>
                 </a:solidFill>
               </a14:hiddenFill>
             </a:ext>
             <a:ext uri="{91240B29-F687-4f45-9708-019B960494DF}">
-              <a14:hiddenLine xmlns="" xmlns:a14="http://schemas.microsoft.com/office/drawing/2010/main" w="9525" cap="flat">
+              <a14:hiddenLine xmlns:a14="http://schemas.microsoft.com/office/drawing/2010/main" xmlns="" w="9525" cap="flat">
                 <a:solidFill>
                   <a:srgbClr val="3465A4"/>
                 </a:solidFill>
@@ -6411,7 +6411,7 @@
               </a14:hiddenLine>
             </a:ext>
             <a:ext uri="{AF507438-7753-43e0-B8FC-AC1667EBCBE1}">
-              <a14:hiddenEffects xmlns="" xmlns:a14="http://schemas.microsoft.com/office/drawing/2010/main">
+              <a14:hiddenEffects xmlns:a14="http://schemas.microsoft.com/office/drawing/2010/main" xmlns="">
                 <a:effectLst>
                   <a:outerShdw blurRad="63500" dist="38099" dir="2700000" algn="ctr" rotWithShape="0">
                     <a:srgbClr val="000000">
@@ -6826,14 +6826,14 @@
           <a:effectLst/>
           <a:extLst>
             <a:ext uri="{909E8E84-426E-40dd-AFC4-6F175D3DCCD1}">
-              <a14:hiddenFill xmlns="" xmlns:a14="http://schemas.microsoft.com/office/drawing/2010/main">
+              <a14:hiddenFill xmlns:a14="http://schemas.microsoft.com/office/drawing/2010/main" xmlns="">
                 <a:solidFill>
                   <a:srgbClr val="FFFFFF"/>
                 </a:solidFill>
               </a14:hiddenFill>
             </a:ext>
             <a:ext uri="{91240B29-F687-4f45-9708-019B960494DF}">
-              <a14:hiddenLine xmlns="" xmlns:a14="http://schemas.microsoft.com/office/drawing/2010/main" w="9525" cap="flat">
+              <a14:hiddenLine xmlns:a14="http://schemas.microsoft.com/office/drawing/2010/main" xmlns="" w="9525" cap="flat">
                 <a:solidFill>
                   <a:srgbClr val="000000"/>
                 </a:solidFill>
@@ -6843,7 +6843,7 @@
               </a14:hiddenLine>
             </a:ext>
             <a:ext uri="{AF507438-7753-43e0-B8FC-AC1667EBCBE1}">
-              <a14:hiddenEffects xmlns="" xmlns:a14="http://schemas.microsoft.com/office/drawing/2010/main">
+              <a14:hiddenEffects xmlns:a14="http://schemas.microsoft.com/office/drawing/2010/main" xmlns="">
                 <a:effectLst>
                   <a:outerShdw blurRad="63500" dist="38099" dir="2700000" algn="ctr" rotWithShape="0">
                     <a:srgbClr val="000000">
@@ -7274,7 +7274,7 @@
           <a:effectLst/>
           <a:extLst>
             <a:ext uri="{AF507438-7753-43e0-B8FC-AC1667EBCBE1}">
-              <a14:hiddenEffects xmlns="" xmlns:a14="http://schemas.microsoft.com/office/drawing/2010/main">
+              <a14:hiddenEffects xmlns:a14="http://schemas.microsoft.com/office/drawing/2010/main" xmlns="">
                 <a:effectLst>
                   <a:outerShdw blurRad="63500" dist="38099" dir="2700000" algn="ctr" rotWithShape="0">
                     <a:schemeClr val="bg2">
@@ -7310,14 +7310,14 @@
           <a:effectLst/>
           <a:extLst>
             <a:ext uri="{909E8E84-426E-40dd-AFC4-6F175D3DCCD1}">
-              <a14:hiddenFill xmlns="" xmlns:a14="http://schemas.microsoft.com/office/drawing/2010/main">
+              <a14:hiddenFill xmlns:a14="http://schemas.microsoft.com/office/drawing/2010/main" xmlns="">
                 <a:solidFill>
                   <a:srgbClr val="FFFFFF"/>
                 </a:solidFill>
               </a14:hiddenFill>
             </a:ext>
             <a:ext uri="{91240B29-F687-4f45-9708-019B960494DF}">
-              <a14:hiddenLine xmlns="" xmlns:a14="http://schemas.microsoft.com/office/drawing/2010/main" w="9525" cap="flat">
+              <a14:hiddenLine xmlns:a14="http://schemas.microsoft.com/office/drawing/2010/main" xmlns="" w="9525" cap="flat">
                 <a:solidFill>
                   <a:srgbClr val="3465A4"/>
                 </a:solidFill>
@@ -7327,7 +7327,7 @@
               </a14:hiddenLine>
             </a:ext>
             <a:ext uri="{AF507438-7753-43e0-B8FC-AC1667EBCBE1}">
-              <a14:hiddenEffects xmlns="" xmlns:a14="http://schemas.microsoft.com/office/drawing/2010/main">
+              <a14:hiddenEffects xmlns:a14="http://schemas.microsoft.com/office/drawing/2010/main" xmlns="">
                 <a:effectLst>
                   <a:outerShdw blurRad="63500" dist="38099" dir="2700000" algn="ctr" rotWithShape="0">
                     <a:srgbClr val="000000">
@@ -7890,7 +7890,7 @@
         <p:spPr>
           <a:xfrm>
             <a:off x="359792" y="395461"/>
-            <a:ext cx="3744416" cy="6832640"/>
+            <a:ext cx="3744416" cy="6555641"/>
           </a:xfrm>
           <a:prstGeom prst="rect">
             <a:avLst/>
@@ -8034,8 +8034,12 @@
               <a:buChar char="-"/>
             </a:pPr>
             <a:r>
+              <a:rPr lang="en-US" dirty="0" smtClean="0"/>
+              <a:t>GPU </a:t>
+            </a:r>
+            <a:r>
               <a:rPr lang="en-US" dirty="0"/>
-              <a:t>Experimental GPU support.</a:t>
+              <a:t>support.</a:t>
             </a:r>
           </a:p>
           <a:p>
@@ -8048,8 +8052,13 @@
             </a:pPr>
             <a:r>
               <a:rPr lang="en-US" dirty="0"/>
-              <a:t>Faster reaction-diffusion: threads, pure-C integration.</a:t>
-            </a:r>
+              <a:t>Faster </a:t>
+            </a:r>
+            <a:r>
+              <a:rPr lang="en-US" dirty="0" smtClean="0"/>
+              <a:t>reaction-diffusion.</a:t>
+            </a:r>
+            <a:endParaRPr lang="en-US" dirty="0"/>
           </a:p>
           <a:p>
             <a:endParaRPr lang="en-US" dirty="0"/>
@@ -8301,7 +8310,7 @@
         <p:spPr>
           <a:xfrm>
             <a:off x="575816" y="1337943"/>
-            <a:ext cx="8928992" cy="3693319"/>
+            <a:ext cx="8928992" cy="4524315"/>
           </a:xfrm>
           <a:prstGeom prst="rect">
             <a:avLst/>
@@ -8381,6 +8390,33 @@
                 <a:schemeClr val="accent2"/>
               </a:solidFill>
             </a:endParaRPr>
+          </a:p>
+          <a:p>
+            <a:endParaRPr lang="en-US" dirty="0" smtClean="0"/>
+          </a:p>
+          <a:p>
+            <a:r>
+              <a:rPr lang="en-US" b="1" dirty="0" err="1" smtClean="0"/>
+              <a:t>ModelDB</a:t>
+            </a:r>
+            <a:r>
+              <a:rPr lang="en-US" dirty="0" smtClean="0"/>
+              <a:t> (over 575 NEURON models):</a:t>
+            </a:r>
+          </a:p>
+          <a:p>
+            <a:r>
+              <a:rPr lang="en-US" dirty="0" smtClean="0"/>
+              <a:t>	</a:t>
+            </a:r>
+            <a:r>
+              <a:rPr lang="en-US" dirty="0" smtClean="0">
+                <a:solidFill>
+                  <a:schemeClr val="accent2"/>
+                </a:solidFill>
+              </a:rPr>
+              <a:t>http://modeldb.yale.edu</a:t>
+            </a:r>
           </a:p>
           <a:p>
             <a:endParaRPr lang="en-US" dirty="0"/>
@@ -8793,7 +8829,7 @@
         <a:effectLst/>
         <a:extLst>
           <a:ext uri="{AF507438-7753-43e0-B8FC-AC1667EBCBE1}">
-            <a14:hiddenEffects xmlns="" xmlns:a14="http://schemas.microsoft.com/office/drawing/2010/main">
+            <a14:hiddenEffects xmlns:a14="http://schemas.microsoft.com/office/drawing/2010/main" xmlns="">
               <a:effectLst>
                 <a:outerShdw blurRad="63500" dist="38099" dir="2700000" algn="ctr" rotWithShape="0">
                   <a:schemeClr val="bg2">
@@ -8867,7 +8903,7 @@
         <a:effectLst/>
         <a:extLst>
           <a:ext uri="{AF507438-7753-43e0-B8FC-AC1667EBCBE1}">
-            <a14:hiddenEffects xmlns="" xmlns:a14="http://schemas.microsoft.com/office/drawing/2010/main">
+            <a14:hiddenEffects xmlns:a14="http://schemas.microsoft.com/office/drawing/2010/main" xmlns="">
               <a:effectLst>
                 <a:outerShdw blurRad="63500" dist="38099" dir="2700000" algn="ctr" rotWithShape="0">
                   <a:schemeClr val="bg2">

</xml_diff>